<commit_message>
ppt white ER diagram
</commit_message>
<xml_diff>
--- a/travelmate.pptx
+++ b/travelmate.pptx
@@ -6960,35 +6960,36 @@
           </a:p>
         </p:txBody>
       </p:sp>
-      <p:sp>
-        <p:nvSpPr>
-          <p:cNvPr id="3" name="object 3"/>
-          <p:cNvSpPr/>
+      <p:pic>
+        <p:nvPicPr>
+          <p:cNvPr id="5" name="Kép 4"/>
+          <p:cNvPicPr>
+            <a:picLocks noChangeAspect="1"/>
+          </p:cNvPicPr>
           <p:nvPr/>
-        </p:nvSpPr>
+        </p:nvPicPr>
+        <p:blipFill>
+          <a:blip r:embed="rId2">
+            <a:extLst>
+              <a:ext uri="{28A0092B-C50C-407E-A947-70E740481C1C}">
+                <a14:useLocalDpi xmlns:a14="http://schemas.microsoft.com/office/drawing/2010/main" val="0"/>
+              </a:ext>
+            </a:extLst>
+          </a:blip>
+          <a:stretch>
+            <a:fillRect/>
+          </a:stretch>
+        </p:blipFill>
         <p:spPr>
           <a:xfrm>
-            <a:off x="1066800" y="723900"/>
-            <a:ext cx="9972675" cy="6038850"/>
+            <a:off x="1054796" y="685800"/>
+            <a:ext cx="10010775" cy="6172200"/>
           </a:xfrm>
           <a:prstGeom prst="rect">
             <a:avLst/>
           </a:prstGeom>
-          <a:blipFill>
-            <a:blip r:embed="rId2" cstate="print"/>
-            <a:stretch>
-              <a:fillRect/>
-            </a:stretch>
-          </a:blipFill>
         </p:spPr>
-        <p:txBody>
-          <a:bodyPr wrap="square" lIns="0" tIns="0" rIns="0" bIns="0" rtlCol="0"/>
-          <a:lstStyle/>
-          <a:p>
-            <a:endParaRPr/>
-          </a:p>
-        </p:txBody>
-      </p:sp>
+      </p:pic>
     </p:spTree>
     <p:extLst>
       <p:ext uri="{BB962C8B-B14F-4D97-AF65-F5344CB8AC3E}">

</xml_diff>

<commit_message>
ppt changed some spacing on slides
</commit_message>
<xml_diff>
--- a/travelmate.pptx
+++ b/travelmate.pptx
@@ -4161,6 +4161,13 @@
   <p:transition spd="slow">
     <p:wipe/>
   </p:transition>
+  <p:timing>
+    <p:tnLst>
+      <p:par>
+        <p:cTn id="1" dur="indefinite" restart="never" nodeType="tmRoot"/>
+      </p:par>
+    </p:tnLst>
+  </p:timing>
 </p:sld>
 </file>
 
@@ -4397,6 +4404,13 @@
   <p:transition spd="slow">
     <p:wipe/>
   </p:transition>
+  <p:timing>
+    <p:tnLst>
+      <p:par>
+        <p:cTn id="1" dur="indefinite" restart="never" nodeType="tmRoot"/>
+      </p:par>
+    </p:tnLst>
+  </p:timing>
 </p:sld>
 </file>
 
@@ -4529,6 +4543,13 @@
   <p:transition spd="slow">
     <p:wipe/>
   </p:transition>
+  <p:timing>
+    <p:tnLst>
+      <p:par>
+        <p:cTn id="1" dur="indefinite" restart="never" nodeType="tmRoot"/>
+      </p:par>
+    </p:tnLst>
+  </p:timing>
 </p:sld>
 </file>
 
@@ -4647,6 +4668,13 @@
   <p:transition spd="slow">
     <p:wipe/>
   </p:transition>
+  <p:timing>
+    <p:tnLst>
+      <p:par>
+        <p:cTn id="1" dur="indefinite" restart="never" nodeType="tmRoot"/>
+      </p:par>
+    </p:tnLst>
+  </p:timing>
 </p:sld>
 </file>
 
@@ -4761,6 +4789,13 @@
   <p:transition spd="slow">
     <p:wipe/>
   </p:transition>
+  <p:timing>
+    <p:tnLst>
+      <p:par>
+        <p:cTn id="1" dur="indefinite" restart="never" nodeType="tmRoot"/>
+      </p:par>
+    </p:tnLst>
+  </p:timing>
 </p:sld>
 </file>
 
@@ -4887,6 +4922,13 @@
   <p:transition spd="slow">
     <p:wipe/>
   </p:transition>
+  <p:timing>
+    <p:tnLst>
+      <p:par>
+        <p:cTn id="1" dur="indefinite" restart="never" nodeType="tmRoot"/>
+      </p:par>
+    </p:tnLst>
+  </p:timing>
 </p:sld>
 </file>
 
@@ -4971,6 +5013,7 @@
                 <a:solidFill>
                   <a:schemeClr val="bg1"/>
                 </a:solidFill>
+                <a:hlinkClick r:id="rId2"/>
               </a:rPr>
               <a:t>https://travelm8.pythonanywhere.com</a:t>
             </a:r>
@@ -4979,9 +5022,15 @@
                 <a:solidFill>
                   <a:schemeClr val="bg1"/>
                 </a:solidFill>
+                <a:hlinkClick r:id="rId2"/>
               </a:rPr>
               <a:t>/</a:t>
             </a:r>
+            <a:endParaRPr lang="en-GB" dirty="0">
+              <a:solidFill>
+                <a:schemeClr val="bg1"/>
+              </a:solidFill>
+            </a:endParaRPr>
           </a:p>
           <a:p>
             <a:endParaRPr lang="fr-BE" dirty="0">
@@ -5005,6 +5054,13 @@
   <p:transition spd="slow">
     <p:wipe/>
   </p:transition>
+  <p:timing>
+    <p:tnLst>
+      <p:par>
+        <p:cTn id="1" dur="indefinite" restart="never" nodeType="tmRoot"/>
+      </p:par>
+    </p:tnLst>
+  </p:timing>
 </p:sld>
 </file>
 
@@ -5303,6 +5359,13 @@
   <p:transition spd="slow">
     <p:wipe/>
   </p:transition>
+  <p:timing>
+    <p:tnLst>
+      <p:par>
+        <p:cTn id="1" dur="indefinite" restart="never" nodeType="tmRoot"/>
+      </p:par>
+    </p:tnLst>
+  </p:timing>
 </p:sld>
 </file>
 
@@ -5371,8 +5434,8 @@
         </p:nvSpPr>
         <p:spPr>
           <a:xfrm>
-            <a:off x="917575" y="1746948"/>
-            <a:ext cx="10273665" cy="4235450"/>
+            <a:off x="917575" y="1508823"/>
+            <a:ext cx="10273665" cy="4934556"/>
           </a:xfrm>
           <a:prstGeom prst="rect">
             <a:avLst/>
@@ -5391,6 +5454,9 @@
               <a:spcBef>
                 <a:spcPts val="955"/>
               </a:spcBef>
+              <a:spcAft>
+                <a:spcPts val="600"/>
+              </a:spcAft>
               <a:buFont typeface="Arial"/>
               <a:buChar char="•"/>
               <a:tabLst>
@@ -5621,7 +5687,7 @@
               </a:rPr>
               <a:t>profile</a:t>
             </a:r>
-            <a:endParaRPr sz="2400">
+            <a:endParaRPr sz="2400" dirty="0">
               <a:latin typeface="Trebuchet MS"/>
               <a:cs typeface="Trebuchet MS"/>
             </a:endParaRPr>
@@ -5634,6 +5700,9 @@
               <a:spcBef>
                 <a:spcPts val="125"/>
               </a:spcBef>
+              <a:spcAft>
+                <a:spcPts val="600"/>
+              </a:spcAft>
               <a:buFont typeface="Arial"/>
               <a:buChar char="•"/>
               <a:tabLst>
@@ -5815,7 +5884,7 @@
               </a:rPr>
               <a:t>the</a:t>
             </a:r>
-            <a:endParaRPr sz="2400">
+            <a:endParaRPr sz="2400" dirty="0">
               <a:latin typeface="Trebuchet MS"/>
               <a:cs typeface="Trebuchet MS"/>
             </a:endParaRPr>
@@ -5828,6 +5897,9 @@
               <a:spcBef>
                 <a:spcPts val="425"/>
               </a:spcBef>
+              <a:spcAft>
+                <a:spcPts val="600"/>
+              </a:spcAft>
             </a:pPr>
             <a:r>
               <a:rPr sz="2400" spc="-105" dirty="0">
@@ -6004,7 +6076,7 @@
               </a:rPr>
               <a:t>world.</a:t>
             </a:r>
-            <a:endParaRPr sz="2400">
+            <a:endParaRPr sz="2400" dirty="0">
               <a:latin typeface="Trebuchet MS"/>
               <a:cs typeface="Trebuchet MS"/>
             </a:endParaRPr>
@@ -6017,6 +6089,9 @@
               <a:spcBef>
                 <a:spcPts val="125"/>
               </a:spcBef>
+              <a:spcAft>
+                <a:spcPts val="600"/>
+              </a:spcAft>
               <a:buFont typeface="Arial"/>
               <a:buChar char="•"/>
               <a:tabLst>
@@ -6170,7 +6245,7 @@
               </a:rPr>
               <a:t>map</a:t>
             </a:r>
-            <a:endParaRPr sz="2400">
+            <a:endParaRPr sz="2400" dirty="0">
               <a:latin typeface="Trebuchet MS"/>
               <a:cs typeface="Trebuchet MS"/>
             </a:endParaRPr>
@@ -6183,6 +6258,9 @@
               <a:spcBef>
                 <a:spcPts val="120"/>
               </a:spcBef>
+              <a:spcAft>
+                <a:spcPts val="600"/>
+              </a:spcAft>
               <a:buFont typeface="Arial"/>
               <a:buChar char="•"/>
               <a:tabLst>
@@ -6350,7 +6428,7 @@
               </a:rPr>
               <a:t>email</a:t>
             </a:r>
-            <a:endParaRPr sz="2400">
+            <a:endParaRPr sz="2400" dirty="0">
               <a:latin typeface="Trebuchet MS"/>
               <a:cs typeface="Trebuchet MS"/>
             </a:endParaRPr>
@@ -6363,6 +6441,9 @@
               <a:spcBef>
                 <a:spcPts val="200"/>
               </a:spcBef>
+              <a:spcAft>
+                <a:spcPts val="600"/>
+              </a:spcAft>
               <a:buFont typeface="Arial"/>
               <a:buChar char="•"/>
               <a:tabLst>
@@ -6544,7 +6625,7 @@
               </a:rPr>
               <a:t>required)</a:t>
             </a:r>
-            <a:endParaRPr sz="2400">
+            <a:endParaRPr sz="2400" dirty="0">
               <a:latin typeface="Trebuchet MS"/>
               <a:cs typeface="Trebuchet MS"/>
             </a:endParaRPr>
@@ -6557,6 +6638,9 @@
               <a:spcBef>
                 <a:spcPts val="125"/>
               </a:spcBef>
+              <a:spcAft>
+                <a:spcPts val="600"/>
+              </a:spcAft>
               <a:buFont typeface="Arial"/>
               <a:buChar char="•"/>
               <a:tabLst>
@@ -6724,7 +6808,7 @@
               </a:rPr>
               <a:t>them</a:t>
             </a:r>
-            <a:endParaRPr sz="2400">
+            <a:endParaRPr sz="2400" dirty="0">
               <a:latin typeface="Trebuchet MS"/>
               <a:cs typeface="Trebuchet MS"/>
             </a:endParaRPr>
@@ -6737,6 +6821,9 @@
               <a:spcBef>
                 <a:spcPts val="125"/>
               </a:spcBef>
+              <a:spcAft>
+                <a:spcPts val="600"/>
+              </a:spcAft>
               <a:buFont typeface="Arial"/>
               <a:buChar char="•"/>
               <a:tabLst>
@@ -6869,7 +6956,7 @@
               </a:rPr>
               <a:t>date</a:t>
             </a:r>
-            <a:endParaRPr sz="2400">
+            <a:endParaRPr sz="2400" dirty="0">
               <a:latin typeface="Trebuchet MS"/>
               <a:cs typeface="Trebuchet MS"/>
             </a:endParaRPr>
@@ -6882,6 +6969,9 @@
               <a:spcBef>
                 <a:spcPts val="125"/>
               </a:spcBef>
+              <a:spcAft>
+                <a:spcPts val="600"/>
+              </a:spcAft>
               <a:buFont typeface="Arial"/>
               <a:buChar char="•"/>
               <a:tabLst>
@@ -7035,7 +7125,7 @@
               </a:rPr>
               <a:t>travel.</a:t>
             </a:r>
-            <a:endParaRPr sz="2400">
+            <a:endParaRPr sz="2400" dirty="0">
               <a:latin typeface="Trebuchet MS"/>
               <a:cs typeface="Trebuchet MS"/>
             </a:endParaRPr>
@@ -7048,6 +7138,9 @@
               <a:spcBef>
                 <a:spcPts val="200"/>
               </a:spcBef>
+              <a:spcAft>
+                <a:spcPts val="600"/>
+              </a:spcAft>
               <a:buFont typeface="Arial"/>
               <a:buChar char="•"/>
               <a:tabLst>
@@ -7215,7 +7308,7 @@
               </a:rPr>
               <a:t>network</a:t>
             </a:r>
-            <a:endParaRPr sz="2400">
+            <a:endParaRPr sz="2400" dirty="0">
               <a:latin typeface="Trebuchet MS"/>
               <a:cs typeface="Trebuchet MS"/>
             </a:endParaRPr>
@@ -7235,6 +7328,13 @@
   <p:transition spd="slow">
     <p:wipe/>
   </p:transition>
+  <p:timing>
+    <p:tnLst>
+      <p:par>
+        <p:cTn id="1" dur="indefinite" restart="never" nodeType="tmRoot"/>
+      </p:par>
+    </p:tnLst>
+  </p:timing>
 </p:sld>
 </file>
 
@@ -7320,7 +7420,7 @@
           </a:prstGeom>
           <a:ln w="9534">
             <a:solidFill>
-              <a:srgbClr val="000000"/>
+              <a:schemeClr val="bg1"/>
             </a:solidFill>
           </a:ln>
         </p:spPr>
@@ -7389,7 +7489,7 @@
           </a:prstGeom>
           <a:ln w="9534">
             <a:solidFill>
-              <a:srgbClr val="000000"/>
+              <a:schemeClr val="bg1"/>
             </a:solidFill>
           </a:ln>
         </p:spPr>
@@ -7437,7 +7537,7 @@
           </a:prstGeom>
           <a:ln w="9534">
             <a:solidFill>
-              <a:srgbClr val="000000"/>
+              <a:schemeClr val="bg1"/>
             </a:solidFill>
           </a:ln>
         </p:spPr>
@@ -7485,7 +7585,7 @@
           </a:prstGeom>
           <a:ln w="9534">
             <a:solidFill>
-              <a:srgbClr val="000000"/>
+              <a:schemeClr val="bg1"/>
             </a:solidFill>
           </a:ln>
         </p:spPr>
@@ -7554,7 +7654,7 @@
           </a:prstGeom>
           <a:ln w="9534">
             <a:solidFill>
-              <a:srgbClr val="000000"/>
+              <a:schemeClr val="bg1"/>
             </a:solidFill>
           </a:ln>
         </p:spPr>
@@ -7626,7 +7726,7 @@
           </a:custGeom>
           <a:ln w="9534">
             <a:solidFill>
-              <a:srgbClr val="000000"/>
+              <a:schemeClr val="bg1"/>
             </a:solidFill>
           </a:ln>
         </p:spPr>
@@ -7654,7 +7754,7 @@
           </a:prstGeom>
           <a:ln w="9534">
             <a:solidFill>
-              <a:srgbClr val="000000"/>
+              <a:schemeClr val="bg1"/>
             </a:solidFill>
           </a:ln>
         </p:spPr>
@@ -7716,7 +7816,7 @@
           </a:prstGeom>
           <a:ln w="9534">
             <a:solidFill>
-              <a:srgbClr val="000000"/>
+              <a:schemeClr val="bg1"/>
             </a:solidFill>
           </a:ln>
         </p:spPr>
@@ -7778,7 +7878,7 @@
           </a:prstGeom>
           <a:ln w="9534">
             <a:solidFill>
-              <a:srgbClr val="000000"/>
+              <a:schemeClr val="bg1"/>
             </a:solidFill>
           </a:ln>
         </p:spPr>
@@ -7840,7 +7940,7 @@
           </a:prstGeom>
           <a:ln w="9534">
             <a:solidFill>
-              <a:srgbClr val="000000"/>
+              <a:schemeClr val="bg1"/>
             </a:solidFill>
           </a:ln>
         </p:spPr>
@@ -7902,7 +8002,7 @@
           </a:prstGeom>
           <a:ln w="9534">
             <a:solidFill>
-              <a:srgbClr val="000000"/>
+              <a:schemeClr val="bg1"/>
             </a:solidFill>
           </a:ln>
         </p:spPr>
@@ -7950,7 +8050,7 @@
           </a:prstGeom>
           <a:ln w="9534">
             <a:solidFill>
-              <a:srgbClr val="000000"/>
+              <a:schemeClr val="bg1"/>
             </a:solidFill>
           </a:ln>
         </p:spPr>
@@ -7998,7 +8098,7 @@
           </a:prstGeom>
           <a:ln w="9534">
             <a:solidFill>
-              <a:srgbClr val="000000"/>
+              <a:schemeClr val="bg1"/>
             </a:solidFill>
           </a:ln>
         </p:spPr>
@@ -8060,7 +8160,7 @@
           </a:custGeom>
           <a:ln w="9534">
             <a:solidFill>
-              <a:srgbClr val="000000"/>
+              <a:schemeClr val="bg1"/>
             </a:solidFill>
           </a:ln>
         </p:spPr>
@@ -8102,7 +8202,7 @@
           </a:custGeom>
           <a:ln w="9534">
             <a:solidFill>
-              <a:srgbClr val="000000"/>
+              <a:schemeClr val="bg1"/>
             </a:solidFill>
           </a:ln>
         </p:spPr>
@@ -8144,7 +8244,7 @@
           </a:custGeom>
           <a:ln w="9534">
             <a:solidFill>
-              <a:srgbClr val="000000"/>
+              <a:schemeClr val="bg1"/>
             </a:solidFill>
           </a:ln>
         </p:spPr>
@@ -8186,7 +8286,7 @@
           </a:custGeom>
           <a:ln w="9534">
             <a:solidFill>
-              <a:srgbClr val="000000"/>
+              <a:schemeClr val="bg1"/>
             </a:solidFill>
           </a:ln>
         </p:spPr>
@@ -8228,7 +8328,7 @@
           </a:custGeom>
           <a:ln w="9534">
             <a:solidFill>
-              <a:srgbClr val="000000"/>
+              <a:schemeClr val="bg1"/>
             </a:solidFill>
           </a:ln>
         </p:spPr>
@@ -8270,7 +8370,7 @@
           </a:custGeom>
           <a:ln w="9534">
             <a:solidFill>
-              <a:srgbClr val="000000"/>
+              <a:schemeClr val="bg1"/>
             </a:solidFill>
           </a:ln>
         </p:spPr>
@@ -8312,7 +8412,7 @@
           </a:custGeom>
           <a:ln w="9534">
             <a:solidFill>
-              <a:srgbClr val="000000"/>
+              <a:schemeClr val="bg1"/>
             </a:solidFill>
           </a:ln>
         </p:spPr>
@@ -8354,7 +8454,7 @@
           </a:custGeom>
           <a:ln w="9534">
             <a:solidFill>
-              <a:srgbClr val="000000"/>
+              <a:schemeClr val="bg1"/>
             </a:solidFill>
           </a:ln>
         </p:spPr>
@@ -8396,7 +8496,7 @@
           </a:custGeom>
           <a:ln w="9534">
             <a:solidFill>
-              <a:srgbClr val="000000"/>
+              <a:schemeClr val="bg1"/>
             </a:solidFill>
           </a:ln>
         </p:spPr>
@@ -8438,7 +8538,7 @@
           </a:custGeom>
           <a:ln w="9534">
             <a:solidFill>
-              <a:srgbClr val="000000"/>
+              <a:schemeClr val="bg1"/>
             </a:solidFill>
           </a:ln>
         </p:spPr>
@@ -8480,7 +8580,7 @@
           </a:custGeom>
           <a:ln w="9534">
             <a:solidFill>
-              <a:srgbClr val="000000"/>
+              <a:schemeClr val="bg1"/>
             </a:solidFill>
           </a:ln>
         </p:spPr>
@@ -8522,7 +8622,7 @@
           </a:custGeom>
           <a:ln w="9534">
             <a:solidFill>
-              <a:srgbClr val="000000"/>
+              <a:schemeClr val="bg1"/>
             </a:solidFill>
           </a:ln>
         </p:spPr>
@@ -8564,7 +8664,7 @@
           </a:custGeom>
           <a:ln w="9534">
             <a:solidFill>
-              <a:srgbClr val="000000"/>
+              <a:schemeClr val="bg1"/>
             </a:solidFill>
           </a:ln>
         </p:spPr>
@@ -8606,7 +8706,7 @@
           </a:custGeom>
           <a:ln w="9534">
             <a:solidFill>
-              <a:srgbClr val="000000"/>
+              <a:schemeClr val="bg1"/>
             </a:solidFill>
           </a:ln>
         </p:spPr>
@@ -8648,7 +8748,7 @@
           </a:custGeom>
           <a:ln w="9534">
             <a:solidFill>
-              <a:srgbClr val="000000"/>
+              <a:schemeClr val="bg1"/>
             </a:solidFill>
           </a:ln>
         </p:spPr>
@@ -8690,7 +8790,7 @@
           </a:custGeom>
           <a:ln w="9534">
             <a:solidFill>
-              <a:srgbClr val="000000"/>
+              <a:schemeClr val="bg1"/>
             </a:solidFill>
           </a:ln>
         </p:spPr>
@@ -8732,7 +8832,7 @@
           </a:custGeom>
           <a:ln w="9534">
             <a:solidFill>
-              <a:srgbClr val="000000"/>
+              <a:schemeClr val="bg1"/>
             </a:solidFill>
           </a:ln>
         </p:spPr>
@@ -8774,7 +8874,7 @@
           </a:custGeom>
           <a:ln w="9534">
             <a:solidFill>
-              <a:srgbClr val="000000"/>
+              <a:schemeClr val="bg1"/>
             </a:solidFill>
           </a:ln>
         </p:spPr>
@@ -8816,7 +8916,7 @@
           </a:custGeom>
           <a:ln w="9534">
             <a:solidFill>
-              <a:srgbClr val="000000"/>
+              <a:schemeClr val="bg1"/>
             </a:solidFill>
           </a:ln>
         </p:spPr>
@@ -8844,7 +8944,7 @@
           </a:prstGeom>
           <a:ln w="9534">
             <a:solidFill>
-              <a:srgbClr val="000000"/>
+              <a:schemeClr val="bg1"/>
             </a:solidFill>
           </a:ln>
         </p:spPr>
@@ -8920,7 +9020,7 @@
           </a:custGeom>
           <a:ln w="9534">
             <a:solidFill>
-              <a:srgbClr val="000000"/>
+              <a:schemeClr val="bg1"/>
             </a:solidFill>
           </a:ln>
         </p:spPr>
@@ -8948,7 +9048,7 @@
           </a:prstGeom>
           <a:ln w="9534">
             <a:solidFill>
-              <a:srgbClr val="000000"/>
+              <a:schemeClr val="bg1"/>
             </a:solidFill>
           </a:ln>
         </p:spPr>
@@ -9024,7 +9124,7 @@
           </a:custGeom>
           <a:ln w="9534">
             <a:solidFill>
-              <a:srgbClr val="000000"/>
+              <a:schemeClr val="bg1"/>
             </a:solidFill>
           </a:ln>
         </p:spPr>
@@ -9066,7 +9166,7 @@
           </a:custGeom>
           <a:ln w="9534">
             <a:solidFill>
-              <a:srgbClr val="000000"/>
+              <a:schemeClr val="bg1"/>
             </a:solidFill>
           </a:ln>
         </p:spPr>
@@ -9108,7 +9208,7 @@
           </a:custGeom>
           <a:ln w="9534">
             <a:solidFill>
-              <a:srgbClr val="000000"/>
+              <a:schemeClr val="bg1"/>
             </a:solidFill>
           </a:ln>
         </p:spPr>
@@ -9133,6 +9233,13 @@
   <p:transition spd="slow">
     <p:wipe/>
   </p:transition>
+  <p:timing>
+    <p:tnLst>
+      <p:par>
+        <p:cTn id="1" dur="indefinite" restart="never" nodeType="tmRoot"/>
+      </p:par>
+    </p:tnLst>
+  </p:timing>
 </p:sld>
 </file>
 
@@ -9602,6 +9709,13 @@
   <p:transition spd="slow">
     <p:wipe/>
   </p:transition>
+  <p:timing>
+    <p:tnLst>
+      <p:par>
+        <p:cTn id="1" dur="indefinite" restart="never" nodeType="tmRoot"/>
+      </p:par>
+    </p:tnLst>
+  </p:timing>
 </p:sld>
 </file>
 
@@ -10907,6 +11021,13 @@
   <p:transition spd="slow">
     <p:wipe/>
   </p:transition>
+  <p:timing>
+    <p:tnLst>
+      <p:par>
+        <p:cTn id="1" dur="indefinite" restart="never" nodeType="tmRoot"/>
+      </p:par>
+    </p:tnLst>
+  </p:timing>
 </p:sld>
 </file>
 
@@ -12164,6 +12285,13 @@
   <p:transition spd="slow">
     <p:wipe/>
   </p:transition>
+  <p:timing>
+    <p:tnLst>
+      <p:par>
+        <p:cTn id="1" dur="indefinite" restart="never" nodeType="tmRoot"/>
+      </p:par>
+    </p:tnLst>
+  </p:timing>
 </p:sld>
 </file>
 
@@ -12270,6 +12398,13 @@
   <p:transition spd="slow">
     <p:wipe/>
   </p:transition>
+  <p:timing>
+    <p:tnLst>
+      <p:par>
+        <p:cTn id="1" dur="indefinite" restart="never" nodeType="tmRoot"/>
+      </p:par>
+    </p:tnLst>
+  </p:timing>
 </p:sld>
 </file>
 

</xml_diff>